<commit_message>
Updated decks to remove/hide slides
</commit_message>
<xml_diff>
--- a/Presentation/Module06-Monitoring.pptx
+++ b/Presentation/Module06-Monitoring.pptx
@@ -34,10 +34,10 @@
     <p:sldId id="1369" r:id="rId25"/>
     <p:sldId id="1353" r:id="rId26"/>
     <p:sldId id="1365" r:id="rId27"/>
-    <p:sldId id="1366" r:id="rId28"/>
-    <p:sldId id="1352" r:id="rId29"/>
-    <p:sldId id="1379" r:id="rId30"/>
-    <p:sldId id="1376" r:id="rId31"/>
+    <p:sldId id="1376" r:id="rId28"/>
+    <p:sldId id="1366" r:id="rId29"/>
+    <p:sldId id="1352" r:id="rId30"/>
+    <p:sldId id="1379" r:id="rId31"/>
     <p:sldId id="1380" r:id="rId32"/>
     <p:sldId id="1362" r:id="rId33"/>
     <p:sldId id="1363" r:id="rId34"/>
@@ -181,10 +181,10 @@
             <p14:sldId id="1369"/>
             <p14:sldId id="1353"/>
             <p14:sldId id="1365"/>
+            <p14:sldId id="1376"/>
             <p14:sldId id="1366"/>
             <p14:sldId id="1352"/>
             <p14:sldId id="1379"/>
-            <p14:sldId id="1376"/>
             <p14:sldId id="1380"/>
           </p14:sldIdLst>
         </p14:section>
@@ -8676,7 +8676,7 @@
               <a:rPr lang="en-US" smtClean="0">
                 <a:latin typeface="Segoe UI" pitchFamily="34" charset="0"/>
               </a:rPr>
-              <a:t>10/7/2016 7:18 PM</a:t>
+              <a:t>10/28/2016 4:25 PM</a:t>
             </a:fld>
             <a:endParaRPr lang="en-US" dirty="0">
               <a:latin typeface="Segoe UI" pitchFamily="34" charset="0"/>
@@ -8954,7 +8954,7 @@
           <a:p>
             <a:fld id="{196BB360-4395-422C-A729-CB974B278917}" type="datetime8">
               <a:rPr lang="en-US" smtClean="0"/>
-              <a:t>10/7/2016 7:18 PM</a:t>
+              <a:t>10/28/2016 4:25 PM</a:t>
             </a:fld>
             <a:endParaRPr lang="en-US" dirty="0"/>
           </a:p>
@@ -9283,7 +9283,7 @@
           <a:p>
             <a:fld id="{B9E68977-C62F-48C1-B8E5-A952982F1FDC}" type="datetime8">
               <a:rPr lang="en-US" smtClean="0"/>
-              <a:t>10/7/2016 7:18 PM</a:t>
+              <a:t>10/28/2016 4:25 PM</a:t>
             </a:fld>
             <a:endParaRPr lang="en-US" dirty="0"/>
           </a:p>
@@ -9409,6 +9409,102 @@
           <a:lstStyle/>
           <a:p>
             <a:r>
+              <a:rPr lang="en-US" dirty="0"/>
+              <a:t>iOS and Android coming soon</a:t>
+            </a:r>
+          </a:p>
+          <a:p>
+            <a:endParaRPr lang="en-US" dirty="0"/>
+          </a:p>
+          <a:p>
+            <a:r>
+              <a:rPr lang="en-US" dirty="0"/>
+              <a:t>TODO: Add to the diagram off the cloud service (collapse this slide into earlier diagram slide)</a:t>
+            </a:r>
+          </a:p>
+        </p:txBody>
+      </p:sp>
+      <p:sp>
+        <p:nvSpPr>
+          <p:cNvPr id="4" name="Slide Number Placeholder 3"/>
+          <p:cNvSpPr>
+            <a:spLocks noGrp="1"/>
+          </p:cNvSpPr>
+          <p:nvPr>
+            <p:ph type="sldNum" sz="quarter" idx="10"/>
+          </p:nvPr>
+        </p:nvSpPr>
+        <p:spPr/>
+        <p:txBody>
+          <a:bodyPr/>
+          <a:lstStyle/>
+          <a:p>
+            <a:fld id="{40B1AD7A-8DF3-4DCE-960D-1DF5B9856ADB}" type="slidenum">
+              <a:rPr lang="en-US" smtClean="0"/>
+              <a:t>32</a:t>
+            </a:fld>
+            <a:endParaRPr lang="en-US" dirty="0"/>
+          </a:p>
+        </p:txBody>
+      </p:sp>
+    </p:spTree>
+    <p:extLst>
+      <p:ext uri="{BB962C8B-B14F-4D97-AF65-F5344CB8AC3E}">
+        <p14:creationId xmlns:p14="http://schemas.microsoft.com/office/powerpoint/2010/main" val="1314748714"/>
+      </p:ext>
+    </p:extLst>
+  </p:cSld>
+  <p:clrMapOvr>
+    <a:masterClrMapping/>
+  </p:clrMapOvr>
+</p:notes>
+</file>
+
+<file path=ppt/notesSlides/notesSlide11.xml><?xml version="1.0" encoding="utf-8"?>
+<p:notes xmlns:a="http://schemas.openxmlformats.org/drawingml/2006/main" xmlns:r="http://schemas.openxmlformats.org/officeDocument/2006/relationships" xmlns:p="http://schemas.openxmlformats.org/presentationml/2006/main">
+  <p:cSld>
+    <p:spTree>
+      <p:nvGrpSpPr>
+        <p:cNvPr id="1" name=""/>
+        <p:cNvGrpSpPr/>
+        <p:nvPr/>
+      </p:nvGrpSpPr>
+      <p:grpSpPr>
+        <a:xfrm>
+          <a:off x="0" y="0"/>
+          <a:ext cx="0" cy="0"/>
+          <a:chOff x="0" y="0"/>
+          <a:chExt cx="0" cy="0"/>
+        </a:xfrm>
+      </p:grpSpPr>
+      <p:sp>
+        <p:nvSpPr>
+          <p:cNvPr id="2" name="Slide Image Placeholder 1"/>
+          <p:cNvSpPr>
+            <a:spLocks noGrp="1" noRot="1" noChangeAspect="1"/>
+          </p:cNvSpPr>
+          <p:nvPr>
+            <p:ph type="sldImg"/>
+          </p:nvPr>
+        </p:nvSpPr>
+        <p:spPr/>
+      </p:sp>
+      <p:sp>
+        <p:nvSpPr>
+          <p:cNvPr id="3" name="Notes Placeholder 2"/>
+          <p:cNvSpPr>
+            <a:spLocks noGrp="1"/>
+          </p:cNvSpPr>
+          <p:nvPr>
+            <p:ph type="body" idx="1"/>
+          </p:nvPr>
+        </p:nvSpPr>
+        <p:spPr/>
+        <p:txBody>
+          <a:bodyPr/>
+          <a:lstStyle/>
+          <a:p>
+            <a:r>
               <a:rPr lang="en-US" dirty="0" err="1"/>
               <a:t>Prereq</a:t>
             </a:r>
@@ -9553,7 +9649,7 @@
           <a:p>
             <a:fld id="{196BB360-4395-422C-A729-CB974B278917}" type="datetime8">
               <a:rPr lang="en-US" smtClean="0"/>
-              <a:t>10/7/2016 7:19 PM</a:t>
+              <a:t>10/28/2016 4:25 PM</a:t>
             </a:fld>
             <a:endParaRPr lang="en-US" dirty="0"/>
           </a:p>
@@ -9596,7 +9692,7 @@
 </p:notes>
 </file>
 
-<file path=ppt/notesSlides/notesSlide11.xml><?xml version="1.0" encoding="utf-8"?>
+<file path=ppt/notesSlides/notesSlide12.xml><?xml version="1.0" encoding="utf-8"?>
 <p:notes xmlns:a="http://schemas.openxmlformats.org/drawingml/2006/main" xmlns:r="http://schemas.openxmlformats.org/officeDocument/2006/relationships" xmlns:p="http://schemas.openxmlformats.org/presentationml/2006/main">
   <p:cSld>
     <p:spTree>
@@ -9703,7 +9799,7 @@
                   <a:prstClr val="black"/>
                 </a:solidFill>
               </a:rPr>
-              <a:t>10/7/2016 7:18 PM</a:t>
+              <a:t>10/28/2016 4:25 PM</a:t>
             </a:fld>
             <a:endParaRPr lang="en-US" dirty="0">
               <a:solidFill>
@@ -9921,7 +10017,7 @@
           <a:p>
             <a:fld id="{196BB360-4395-422C-A729-CB974B278917}" type="datetime8">
               <a:rPr lang="en-US" smtClean="0"/>
-              <a:t>10/7/2016 7:18 PM</a:t>
+              <a:t>10/28/2016 4:25 PM</a:t>
             </a:fld>
             <a:endParaRPr lang="en-US" dirty="0"/>
           </a:p>
@@ -10089,7 +10185,7 @@
           <a:p>
             <a:fld id="{196BB360-4395-422C-A729-CB974B278917}" type="datetime8">
               <a:rPr lang="en-US" smtClean="0"/>
-              <a:t>10/7/2016 7:18 PM</a:t>
+              <a:t>10/28/2016 4:25 PM</a:t>
             </a:fld>
             <a:endParaRPr lang="en-US" dirty="0"/>
           </a:p>
@@ -10298,7 +10394,7 @@
           <a:p>
             <a:fld id="{196BB360-4395-422C-A729-CB974B278917}" type="datetime8">
               <a:rPr lang="en-US" smtClean="0"/>
-              <a:t>10/7/2016 7:18 PM</a:t>
+              <a:t>10/28/2016 4:25 PM</a:t>
             </a:fld>
             <a:endParaRPr lang="en-US" dirty="0"/>
           </a:p>
@@ -10463,7 +10559,7 @@
           <a:p>
             <a:fld id="{196BB360-4395-422C-A729-CB974B278917}" type="datetime8">
               <a:rPr lang="en-US" smtClean="0"/>
-              <a:t>10/7/2016 7:18 PM</a:t>
+              <a:t>10/28/2016 4:25 PM</a:t>
             </a:fld>
             <a:endParaRPr lang="en-US" dirty="0"/>
           </a:p>
@@ -10552,8 +10648,25 @@
           <a:p>
             <a:r>
               <a:rPr lang="en-US" dirty="0"/>
-              <a:t>https://azure.microsoft.com/en-us/documentation/articles/app-insights-sampling</a:t>
+              <a:t>Show</a:t>
             </a:r>
+            <a:r>
+              <a:rPr lang="en-US" baseline="0" dirty="0"/>
+              <a:t> app insights resource</a:t>
+            </a:r>
+          </a:p>
+          <a:p>
+            <a:r>
+              <a:rPr lang="en-US" baseline="0" dirty="0"/>
+              <a:t>Show .NET with live site capabilities</a:t>
+            </a:r>
+          </a:p>
+          <a:p>
+            <a:r>
+              <a:rPr lang="en-US" baseline="0" dirty="0"/>
+              <a:t>Show  web test</a:t>
+            </a:r>
+            <a:endParaRPr lang="en-US" dirty="0"/>
           </a:p>
         </p:txBody>
       </p:sp>
@@ -10593,7 +10706,7 @@
           <a:p>
             <a:pPr marL="398463" defTabSz="914099" eaLnBrk="0" hangingPunct="0"/>
             <a:r>
-              <a:rPr lang="en-US" sz="400" dirty="0">
+              <a:rPr lang="en-US" sz="400">
                 <a:gradFill>
                   <a:gsLst>
                     <a:gs pos="0">
@@ -10611,6 +10724,22 @@
               </a:rPr>
               <a:t>© Microsoft Corporation. All rights reserved. </a:t>
             </a:r>
+            <a:endParaRPr lang="en-US" sz="400" dirty="0">
+              <a:gradFill>
+                <a:gsLst>
+                  <a:gs pos="0">
+                    <a:schemeClr val="tx1"/>
+                  </a:gs>
+                  <a:gs pos="100000">
+                    <a:schemeClr val="tx1"/>
+                  </a:gs>
+                </a:gsLst>
+                <a:lin ang="5400000" scaled="0"/>
+              </a:gradFill>
+              <a:latin typeface="Segoe UI" pitchFamily="34" charset="0"/>
+              <a:ea typeface="Segoe UI" pitchFamily="34" charset="0"/>
+              <a:cs typeface="Segoe UI" pitchFamily="34" charset="0"/>
+            </a:endParaRPr>
           </a:p>
         </p:txBody>
       </p:sp>
@@ -10631,7 +10760,7 @@
           <a:p>
             <a:fld id="{196BB360-4395-422C-A729-CB974B278917}" type="datetime8">
               <a:rPr lang="en-US" smtClean="0"/>
-              <a:t>10/7/2016 7:18 PM</a:t>
+              <a:t>10/28/2016 4:25 PM</a:t>
             </a:fld>
             <a:endParaRPr lang="en-US" dirty="0"/>
           </a:p>
@@ -10664,7 +10793,7 @@
     </p:spTree>
     <p:extLst>
       <p:ext uri="{BB962C8B-B14F-4D97-AF65-F5344CB8AC3E}">
-        <p14:creationId xmlns:p14="http://schemas.microsoft.com/office/powerpoint/2010/main" val="3332181897"/>
+        <p14:creationId xmlns:p14="http://schemas.microsoft.com/office/powerpoint/2010/main" val="2320199116"/>
       </p:ext>
     </p:extLst>
   </p:cSld>
@@ -10720,25 +10849,8 @@
           <a:p>
             <a:r>
               <a:rPr lang="en-US" dirty="0"/>
-              <a:t>Show</a:t>
+              <a:t>https://azure.microsoft.com/en-us/documentation/articles/app-insights-sampling</a:t>
             </a:r>
-            <a:r>
-              <a:rPr lang="en-US" baseline="0" dirty="0"/>
-              <a:t> app insights resource</a:t>
-            </a:r>
-          </a:p>
-          <a:p>
-            <a:r>
-              <a:rPr lang="en-US" baseline="0" dirty="0"/>
-              <a:t>Show .NET with live site capabilities</a:t>
-            </a:r>
-          </a:p>
-          <a:p>
-            <a:r>
-              <a:rPr lang="en-US" baseline="0" dirty="0"/>
-              <a:t>Show  web test</a:t>
-            </a:r>
-            <a:endParaRPr lang="en-US" dirty="0"/>
           </a:p>
         </p:txBody>
       </p:sp>
@@ -10778,7 +10890,7 @@
           <a:p>
             <a:pPr marL="398463" defTabSz="914099" eaLnBrk="0" hangingPunct="0"/>
             <a:r>
-              <a:rPr lang="en-US" sz="400">
+              <a:rPr lang="en-US" sz="400" dirty="0">
                 <a:gradFill>
                   <a:gsLst>
                     <a:gs pos="0">
@@ -10796,22 +10908,6 @@
               </a:rPr>
               <a:t>© Microsoft Corporation. All rights reserved. </a:t>
             </a:r>
-            <a:endParaRPr lang="en-US" sz="400" dirty="0">
-              <a:gradFill>
-                <a:gsLst>
-                  <a:gs pos="0">
-                    <a:schemeClr val="tx1"/>
-                  </a:gs>
-                  <a:gs pos="100000">
-                    <a:schemeClr val="tx1"/>
-                  </a:gs>
-                </a:gsLst>
-                <a:lin ang="5400000" scaled="0"/>
-              </a:gradFill>
-              <a:latin typeface="Segoe UI" pitchFamily="34" charset="0"/>
-              <a:ea typeface="Segoe UI" pitchFamily="34" charset="0"/>
-              <a:cs typeface="Segoe UI" pitchFamily="34" charset="0"/>
-            </a:endParaRPr>
           </a:p>
         </p:txBody>
       </p:sp>
@@ -10832,7 +10928,7 @@
           <a:p>
             <a:fld id="{196BB360-4395-422C-A729-CB974B278917}" type="datetime8">
               <a:rPr lang="en-US" smtClean="0"/>
-              <a:t>10/7/2016 7:19 PM</a:t>
+              <a:t>10/28/2016 4:25 PM</a:t>
             </a:fld>
             <a:endParaRPr lang="en-US" dirty="0"/>
           </a:p>
@@ -10856,7 +10952,7 @@
             <a:fld id="{B4008EB6-D09E-4580-8CD6-DDB14511944F}" type="slidenum">
               <a:rPr lang="en-US" smtClean="0"/>
               <a:pPr/>
-              <a:t>24</a:t>
+              <a:t>22</a:t>
             </a:fld>
             <a:endParaRPr lang="en-US" dirty="0"/>
           </a:p>
@@ -10865,7 +10961,7 @@
     </p:spTree>
     <p:extLst>
       <p:ext uri="{BB962C8B-B14F-4D97-AF65-F5344CB8AC3E}">
-        <p14:creationId xmlns:p14="http://schemas.microsoft.com/office/powerpoint/2010/main" val="2320199116"/>
+        <p14:creationId xmlns:p14="http://schemas.microsoft.com/office/powerpoint/2010/main" val="3332181897"/>
       </p:ext>
     </p:extLst>
   </p:cSld>
@@ -11017,7 +11113,7 @@
           <a:p>
             <a:fld id="{38EEC551-8CDA-4EB6-89BB-2A86C9F091C8}" type="datetime8">
               <a:rPr lang="en-US" smtClean="0"/>
-              <a:t>10/7/2016 7:18 PM</a:t>
+              <a:t>10/28/2016 4:25 PM</a:t>
             </a:fld>
             <a:endParaRPr lang="en-US" dirty="0"/>
           </a:p>
@@ -11104,30 +11200,41 @@
           <a:bodyPr/>
           <a:lstStyle/>
           <a:p>
+            <a:pPr marL="0" marR="0" lvl="0" indent="0" algn="l" defTabSz="932742" rtl="0" eaLnBrk="1" fontAlgn="auto" latinLnBrk="0" hangingPunct="1">
+              <a:lnSpc>
+                <a:spcPct val="90000"/>
+              </a:lnSpc>
+              <a:spcBef>
+                <a:spcPts val="0"/>
+              </a:spcBef>
+              <a:spcAft>
+                <a:spcPts val="340"/>
+              </a:spcAft>
+              <a:buClrTx/>
+              <a:buSzTx/>
+              <a:buFontTx/>
+              <a:buNone/>
+              <a:tabLst/>
+              <a:defRPr/>
+            </a:pPr>
             <a:r>
               <a:rPr lang="en-US" dirty="0"/>
-              <a:t>iOS and Android coming soon</a:t>
+              <a:t>Solutions are a set of data acquisition rules coupled with analytics logic and visualization that address key challenges for customers. </a:t>
             </a:r>
           </a:p>
           <a:p>
             <a:endParaRPr lang="en-US" dirty="0"/>
-          </a:p>
-          <a:p>
-            <a:r>
-              <a:rPr lang="en-US" dirty="0"/>
-              <a:t>TODO: Add to the diagram off the cloud service (collapse this slide into earlier diagram slide)</a:t>
-            </a:r>
           </a:p>
         </p:txBody>
       </p:sp>
       <p:sp>
         <p:nvSpPr>
-          <p:cNvPr id="4" name="Slide Number Placeholder 3"/>
+          <p:cNvPr id="4" name="Header Placeholder 3"/>
           <p:cNvSpPr>
             <a:spLocks noGrp="1"/>
           </p:cNvSpPr>
           <p:nvPr>
-            <p:ph type="sldNum" sz="quarter" idx="10"/>
+            <p:ph type="hdr" sz="quarter" idx="10"/>
           </p:nvPr>
         </p:nvSpPr>
         <p:spPr/>
@@ -11135,9 +11242,106 @@
           <a:bodyPr/>
           <a:lstStyle/>
           <a:p>
-            <a:fld id="{40B1AD7A-8DF3-4DCE-960D-1DF5B9856ADB}" type="slidenum">
+            <a:endParaRPr lang="en-US" dirty="0"/>
+          </a:p>
+        </p:txBody>
+      </p:sp>
+      <p:sp>
+        <p:nvSpPr>
+          <p:cNvPr id="5" name="Footer Placeholder 4"/>
+          <p:cNvSpPr>
+            <a:spLocks noGrp="1"/>
+          </p:cNvSpPr>
+          <p:nvPr>
+            <p:ph type="ftr" sz="quarter" idx="11"/>
+          </p:nvPr>
+        </p:nvSpPr>
+        <p:spPr/>
+        <p:txBody>
+          <a:bodyPr/>
+          <a:lstStyle/>
+          <a:p>
+            <a:pPr marL="398463" defTabSz="914099" eaLnBrk="0" hangingPunct="0"/>
+            <a:r>
+              <a:rPr lang="en-US" sz="400">
+                <a:gradFill>
+                  <a:gsLst>
+                    <a:gs pos="0">
+                      <a:schemeClr val="tx1"/>
+                    </a:gs>
+                    <a:gs pos="100000">
+                      <a:schemeClr val="tx1"/>
+                    </a:gs>
+                  </a:gsLst>
+                  <a:lin ang="5400000" scaled="0"/>
+                </a:gradFill>
+                <a:latin typeface="Segoe UI" pitchFamily="34" charset="0"/>
+                <a:ea typeface="Segoe UI" pitchFamily="34" charset="0"/>
+                <a:cs typeface="Segoe UI" pitchFamily="34" charset="0"/>
+              </a:rPr>
+              <a:t>© Microsoft Corporation. All rights reserved. </a:t>
+            </a:r>
+            <a:endParaRPr lang="en-US" sz="400" dirty="0">
+              <a:gradFill>
+                <a:gsLst>
+                  <a:gs pos="0">
+                    <a:schemeClr val="tx1"/>
+                  </a:gs>
+                  <a:gs pos="100000">
+                    <a:schemeClr val="tx1"/>
+                  </a:gs>
+                </a:gsLst>
+                <a:lin ang="5400000" scaled="0"/>
+              </a:gradFill>
+              <a:latin typeface="Segoe UI" pitchFamily="34" charset="0"/>
+              <a:ea typeface="Segoe UI" pitchFamily="34" charset="0"/>
+              <a:cs typeface="Segoe UI" pitchFamily="34" charset="0"/>
+            </a:endParaRPr>
+          </a:p>
+        </p:txBody>
+      </p:sp>
+      <p:sp>
+        <p:nvSpPr>
+          <p:cNvPr id="6" name="Date Placeholder 5"/>
+          <p:cNvSpPr>
+            <a:spLocks noGrp="1"/>
+          </p:cNvSpPr>
+          <p:nvPr>
+            <p:ph type="dt" idx="12"/>
+          </p:nvPr>
+        </p:nvSpPr>
+        <p:spPr/>
+        <p:txBody>
+          <a:bodyPr/>
+          <a:lstStyle/>
+          <a:p>
+            <a:fld id="{196BB360-4395-422C-A729-CB974B278917}" type="datetime8">
               <a:rPr lang="en-US" smtClean="0"/>
-              <a:t>32</a:t>
+              <a:t>10/28/2016 4:27 PM</a:t>
+            </a:fld>
+            <a:endParaRPr lang="en-US" dirty="0"/>
+          </a:p>
+        </p:txBody>
+      </p:sp>
+      <p:sp>
+        <p:nvSpPr>
+          <p:cNvPr id="7" name="Slide Number Placeholder 6"/>
+          <p:cNvSpPr>
+            <a:spLocks noGrp="1"/>
+          </p:cNvSpPr>
+          <p:nvPr>
+            <p:ph type="sldNum" sz="quarter" idx="13"/>
+          </p:nvPr>
+        </p:nvSpPr>
+        <p:spPr/>
+        <p:txBody>
+          <a:bodyPr/>
+          <a:lstStyle/>
+          <a:p>
+            <a:fld id="{B4008EB6-D09E-4580-8CD6-DDB14511944F}" type="slidenum">
+              <a:rPr lang="en-US" smtClean="0"/>
+              <a:pPr/>
+              <a:t>30</a:t>
             </a:fld>
             <a:endParaRPr lang="en-US" dirty="0"/>
           </a:p>
@@ -11146,7 +11350,7 @@
     </p:spTree>
     <p:extLst>
       <p:ext uri="{BB962C8B-B14F-4D97-AF65-F5344CB8AC3E}">
-        <p14:creationId xmlns:p14="http://schemas.microsoft.com/office/powerpoint/2010/main" val="1314748714"/>
+        <p14:creationId xmlns:p14="http://schemas.microsoft.com/office/powerpoint/2010/main" val="381785512"/>
       </p:ext>
     </p:extLst>
   </p:cSld>
@@ -39688,21 +39892,6 @@
               <a:t>Speaker Name</a:t>
             </a:r>
           </a:p>
-          <a:p>
-            <a:pPr lvl="0"/>
-            <a:endParaRPr lang="en-US" sz="1600" dirty="0">
-              <a:latin typeface="Segoe UI"/>
-            </a:endParaRPr>
-          </a:p>
-          <a:p>
-            <a:pPr lvl="0"/>
-            <a:r>
-              <a:rPr lang="en-US" sz="1800" dirty="0">
-                <a:latin typeface="Segoe UI"/>
-              </a:rPr>
-              <a:t>speaker@email.tld</a:t>
-            </a:r>
-          </a:p>
         </p:txBody>
       </p:sp>
     </p:spTree>
@@ -42236,7 +42425,7 @@
 </file>
 
 <file path=ppt/slides/slide19.xml><?xml version="1.0" encoding="utf-8"?>
-<p:sld xmlns:a="http://schemas.openxmlformats.org/drawingml/2006/main" xmlns:r="http://schemas.openxmlformats.org/officeDocument/2006/relationships" xmlns:p="http://schemas.openxmlformats.org/presentationml/2006/main">
+<p:sld xmlns:a="http://schemas.openxmlformats.org/drawingml/2006/main" xmlns:r="http://schemas.openxmlformats.org/officeDocument/2006/relationships" xmlns:p="http://schemas.openxmlformats.org/presentationml/2006/main" show="0">
   <p:cSld>
     <p:spTree>
       <p:nvGrpSpPr>
@@ -42603,6 +42792,92 @@
 
 <file path=ppt/slides/slide21.xml><?xml version="1.0" encoding="utf-8"?>
 <p:sld xmlns:a="http://schemas.openxmlformats.org/drawingml/2006/main" xmlns:r="http://schemas.openxmlformats.org/officeDocument/2006/relationships" xmlns:p="http://schemas.openxmlformats.org/presentationml/2006/main">
+  <p:cSld>
+    <p:spTree>
+      <p:nvGrpSpPr>
+        <p:cNvPr id="1" name=""/>
+        <p:cNvGrpSpPr/>
+        <p:nvPr/>
+      </p:nvGrpSpPr>
+      <p:grpSpPr>
+        <a:xfrm>
+          <a:off x="0" y="0"/>
+          <a:ext cx="0" cy="0"/>
+          <a:chOff x="0" y="0"/>
+          <a:chExt cx="0" cy="0"/>
+        </a:xfrm>
+      </p:grpSpPr>
+      <p:sp>
+        <p:nvSpPr>
+          <p:cNvPr id="3" name="Title 2"/>
+          <p:cNvSpPr>
+            <a:spLocks noGrp="1"/>
+          </p:cNvSpPr>
+          <p:nvPr>
+            <p:ph type="title"/>
+          </p:nvPr>
+        </p:nvSpPr>
+        <p:spPr/>
+        <p:txBody>
+          <a:bodyPr/>
+          <a:lstStyle/>
+          <a:p>
+            <a:r>
+              <a:rPr lang="en-US" dirty="0"/>
+              <a:t>Demo</a:t>
+            </a:r>
+          </a:p>
+        </p:txBody>
+      </p:sp>
+      <p:sp>
+        <p:nvSpPr>
+          <p:cNvPr id="4" name="Text Placeholder 3"/>
+          <p:cNvSpPr>
+            <a:spLocks noGrp="1"/>
+          </p:cNvSpPr>
+          <p:nvPr>
+            <p:ph type="body" sz="quarter" idx="12"/>
+          </p:nvPr>
+        </p:nvSpPr>
+        <p:spPr/>
+        <p:txBody>
+          <a:bodyPr/>
+          <a:lstStyle/>
+          <a:p>
+            <a:r>
+              <a:rPr lang="en-US" dirty="0"/>
+              <a:t>Application Insights</a:t>
+            </a:r>
+          </a:p>
+        </p:txBody>
+      </p:sp>
+    </p:spTree>
+    <p:extLst>
+      <p:ext uri="{BB962C8B-B14F-4D97-AF65-F5344CB8AC3E}">
+        <p14:creationId xmlns:p14="http://schemas.microsoft.com/office/powerpoint/2010/main" val="2445022681"/>
+      </p:ext>
+    </p:extLst>
+  </p:cSld>
+  <p:clrMapOvr>
+    <a:masterClrMapping/>
+  </p:clrMapOvr>
+  <mc:AlternateContent xmlns:mc="http://schemas.openxmlformats.org/markup-compatibility/2006" xmlns:p14="http://schemas.microsoft.com/office/powerpoint/2010/main">
+    <mc:Choice Requires="p14">
+      <p:transition spd="slow" p14:dur="3400">
+        <p14:reveal/>
+      </p:transition>
+    </mc:Choice>
+    <mc:Fallback xmlns="">
+      <p:transition spd="slow">
+        <p:fade/>
+      </p:transition>
+    </mc:Fallback>
+  </mc:AlternateContent>
+</p:sld>
+</file>
+
+<file path=ppt/slides/slide22.xml><?xml version="1.0" encoding="utf-8"?>
+<p:sld xmlns:a="http://schemas.openxmlformats.org/drawingml/2006/main" xmlns:r="http://schemas.openxmlformats.org/officeDocument/2006/relationships" xmlns:p="http://schemas.openxmlformats.org/presentationml/2006/main" show="0">
   <p:cSld>
     <p:spTree>
       <p:nvGrpSpPr>
@@ -43754,7 +44029,7 @@
 </p:sld>
 </file>
 
-<file path=ppt/slides/slide22.xml><?xml version="1.0" encoding="utf-8"?>
+<file path=ppt/slides/slide23.xml><?xml version="1.0" encoding="utf-8"?>
 <p:sld xmlns:a="http://schemas.openxmlformats.org/drawingml/2006/main" xmlns:r="http://schemas.openxmlformats.org/officeDocument/2006/relationships" xmlns:p="http://schemas.openxmlformats.org/presentationml/2006/main">
   <p:cSld>
     <p:spTree>
@@ -43854,7 +44129,7 @@
 </p:sld>
 </file>
 
-<file path=ppt/slides/slide23.xml><?xml version="1.0" encoding="utf-8"?>
+<file path=ppt/slides/slide24.xml><?xml version="1.0" encoding="utf-8"?>
 <p:sld xmlns:a="http://schemas.openxmlformats.org/drawingml/2006/main" xmlns:r="http://schemas.openxmlformats.org/officeDocument/2006/relationships" xmlns:p="http://schemas.openxmlformats.org/presentationml/2006/main">
   <p:cSld>
     <p:spTree>
@@ -44074,92 +44349,6 @@
       </p:bldGraphic>
     </p:bldLst>
   </p:timing>
-</p:sld>
-</file>
-
-<file path=ppt/slides/slide24.xml><?xml version="1.0" encoding="utf-8"?>
-<p:sld xmlns:a="http://schemas.openxmlformats.org/drawingml/2006/main" xmlns:r="http://schemas.openxmlformats.org/officeDocument/2006/relationships" xmlns:p="http://schemas.openxmlformats.org/presentationml/2006/main">
-  <p:cSld>
-    <p:spTree>
-      <p:nvGrpSpPr>
-        <p:cNvPr id="1" name=""/>
-        <p:cNvGrpSpPr/>
-        <p:nvPr/>
-      </p:nvGrpSpPr>
-      <p:grpSpPr>
-        <a:xfrm>
-          <a:off x="0" y="0"/>
-          <a:ext cx="0" cy="0"/>
-          <a:chOff x="0" y="0"/>
-          <a:chExt cx="0" cy="0"/>
-        </a:xfrm>
-      </p:grpSpPr>
-      <p:sp>
-        <p:nvSpPr>
-          <p:cNvPr id="3" name="Title 2"/>
-          <p:cNvSpPr>
-            <a:spLocks noGrp="1"/>
-          </p:cNvSpPr>
-          <p:nvPr>
-            <p:ph type="title"/>
-          </p:nvPr>
-        </p:nvSpPr>
-        <p:spPr/>
-        <p:txBody>
-          <a:bodyPr/>
-          <a:lstStyle/>
-          <a:p>
-            <a:r>
-              <a:rPr lang="en-US" dirty="0"/>
-              <a:t>Demo</a:t>
-            </a:r>
-          </a:p>
-        </p:txBody>
-      </p:sp>
-      <p:sp>
-        <p:nvSpPr>
-          <p:cNvPr id="4" name="Text Placeholder 3"/>
-          <p:cNvSpPr>
-            <a:spLocks noGrp="1"/>
-          </p:cNvSpPr>
-          <p:nvPr>
-            <p:ph type="body" sz="quarter" idx="12"/>
-          </p:nvPr>
-        </p:nvSpPr>
-        <p:spPr/>
-        <p:txBody>
-          <a:bodyPr/>
-          <a:lstStyle/>
-          <a:p>
-            <a:r>
-              <a:rPr lang="en-US" dirty="0"/>
-              <a:t>Application Insights</a:t>
-            </a:r>
-          </a:p>
-        </p:txBody>
-      </p:sp>
-    </p:spTree>
-    <p:extLst>
-      <p:ext uri="{BB962C8B-B14F-4D97-AF65-F5344CB8AC3E}">
-        <p14:creationId xmlns:p14="http://schemas.microsoft.com/office/powerpoint/2010/main" val="2445022681"/>
-      </p:ext>
-    </p:extLst>
-  </p:cSld>
-  <p:clrMapOvr>
-    <a:masterClrMapping/>
-  </p:clrMapOvr>
-  <mc:AlternateContent xmlns:mc="http://schemas.openxmlformats.org/markup-compatibility/2006" xmlns:p14="http://schemas.microsoft.com/office/powerpoint/2010/main">
-    <mc:Choice Requires="p14">
-      <p:transition spd="slow" p14:dur="3400">
-        <p14:reveal/>
-      </p:transition>
-    </mc:Choice>
-    <mc:Fallback xmlns="">
-      <p:transition spd="slow">
-        <p:fade/>
-      </p:transition>
-    </mc:Fallback>
-  </mc:AlternateContent>
 </p:sld>
 </file>
 
@@ -46311,7 +46500,7 @@
 </file>
 
 <file path=ppt/slides/slide29.xml><?xml version="1.0" encoding="utf-8"?>
-<p:sld xmlns:a="http://schemas.openxmlformats.org/drawingml/2006/main" xmlns:r="http://schemas.openxmlformats.org/officeDocument/2006/relationships" xmlns:p="http://schemas.openxmlformats.org/presentationml/2006/main">
+<p:sld xmlns:a="http://schemas.openxmlformats.org/drawingml/2006/main" xmlns:r="http://schemas.openxmlformats.org/officeDocument/2006/relationships" xmlns:p="http://schemas.openxmlformats.org/presentationml/2006/main" show="0">
   <p:cSld>
     <p:spTree>
       <p:nvGrpSpPr>
@@ -47682,7 +47871,7 @@
           <p:nvPr/>
         </p:nvPicPr>
         <p:blipFill>
-          <a:blip r:embed="rId2"/>
+          <a:blip r:embed="rId3"/>
           <a:stretch>
             <a:fillRect/>
           </a:stretch>
@@ -47802,7 +47991,7 @@
 </file>
 
 <file path=ppt/slides/slide32.xml><?xml version="1.0" encoding="utf-8"?>
-<p:sld xmlns:a="http://schemas.openxmlformats.org/drawingml/2006/main" xmlns:r="http://schemas.openxmlformats.org/officeDocument/2006/relationships" xmlns:p="http://schemas.openxmlformats.org/presentationml/2006/main">
+<p:sld xmlns:a="http://schemas.openxmlformats.org/drawingml/2006/main" xmlns:r="http://schemas.openxmlformats.org/officeDocument/2006/relationships" xmlns:p="http://schemas.openxmlformats.org/presentationml/2006/main" show="0">
   <p:cSld>
     <p:spTree>
       <p:nvGrpSpPr>
@@ -53834,21 +54023,12 @@
 </file>
 
 <file path=customXml/item1.xml><?xml version="1.0" encoding="utf-8"?>
-<?mso-contentType ?>
-<FormTemplates xmlns="http://schemas.microsoft.com/sharepoint/v3/contenttype/forms">
-  <Display>DocumentLibraryForm</Display>
-  <Edit>DocumentLibraryForm</Edit>
-  <New>DocumentLibraryForm</New>
-</FormTemplates>
-</file>
-
-<file path=customXml/item2.xml><?xml version="1.0" encoding="utf-8"?>
 <p:properties xmlns:p="http://schemas.microsoft.com/office/2006/metadata/properties" xmlns:xsi="http://www.w3.org/2001/XMLSchema-instance" xmlns:pc="http://schemas.microsoft.com/office/infopath/2007/PartnerControls">
   <documentManagement/>
 </p:properties>
 </file>
 
-<file path=customXml/item3.xml><?xml version="1.0" encoding="utf-8"?>
+<file path=customXml/item2.xml><?xml version="1.0" encoding="utf-8"?>
 <ct:contentTypeSchema xmlns:ct="http://schemas.microsoft.com/office/2006/metadata/contentType" xmlns:ma="http://schemas.microsoft.com/office/2006/metadata/properties/metaAttributes" ct:_="" ma:_="" ma:contentTypeName="Document" ma:contentTypeID="0x010100A2B0BB5962AB3C45A9A1CE1EC4C4F647" ma:contentTypeVersion="3" ma:contentTypeDescription="Create a new document." ma:contentTypeScope="" ma:versionID="f0876370c90de824ab54c09b0bd2a056">
   <xsd:schema xmlns:xsd="http://www.w3.org/2001/XMLSchema" xmlns:xs="http://www.w3.org/2001/XMLSchema" xmlns:p="http://schemas.microsoft.com/office/2006/metadata/properties" xmlns:ns3="630a2e83-186a-4a0f-ab27-bee8a8096abc" targetNamespace="http://schemas.microsoft.com/office/2006/metadata/properties" ma:root="true" ma:fieldsID="a2a3b5ed8b4accd7c8a398d0cb075271" ns3:_="">
     <xsd:import namespace="630a2e83-186a-4a0f-ab27-bee8a8096abc"/>
@@ -54002,15 +54182,16 @@
 </ct:contentTypeSchema>
 </file>
 
-<file path=customXml/itemProps1.xml><?xml version="1.0" encoding="utf-8"?>
-<ds:datastoreItem xmlns:ds="http://schemas.openxmlformats.org/officeDocument/2006/customXml" ds:itemID="{758FDAC0-319D-4A54-8D8E-1D42CB1F8004}">
-  <ds:schemaRefs>
-    <ds:schemaRef ds:uri="http://schemas.microsoft.com/sharepoint/v3/contenttype/forms"/>
-  </ds:schemaRefs>
-</ds:datastoreItem>
+<file path=customXml/item3.xml><?xml version="1.0" encoding="utf-8"?>
+<?mso-contentType ?>
+<FormTemplates xmlns="http://schemas.microsoft.com/sharepoint/v3/contenttype/forms">
+  <Display>DocumentLibraryForm</Display>
+  <Edit>DocumentLibraryForm</Edit>
+  <New>DocumentLibraryForm</New>
+</FormTemplates>
 </file>
 
-<file path=customXml/itemProps2.xml><?xml version="1.0" encoding="utf-8"?>
+<file path=customXml/itemProps1.xml><?xml version="1.0" encoding="utf-8"?>
 <ds:datastoreItem xmlns:ds="http://schemas.openxmlformats.org/officeDocument/2006/customXml" ds:itemID="{F990F116-B58F-4255-B05B-DA3808E0E5C6}">
   <ds:schemaRefs>
     <ds:schemaRef ds:uri="http://schemas.microsoft.com/office/2006/metadata/properties"/>
@@ -54026,7 +54207,7 @@
 </ds:datastoreItem>
 </file>
 
-<file path=customXml/itemProps3.xml><?xml version="1.0" encoding="utf-8"?>
+<file path=customXml/itemProps2.xml><?xml version="1.0" encoding="utf-8"?>
 <ds:datastoreItem xmlns:ds="http://schemas.openxmlformats.org/officeDocument/2006/customXml" ds:itemID="{F4553072-E538-48C4-90FC-3653F32D67C5}">
   <ds:schemaRefs>
     <ds:schemaRef ds:uri="http://schemas.microsoft.com/office/2006/metadata/contentType"/>
@@ -54042,4 +54223,12 @@
     <ds:schemaRef ds:uri="http://schemas.microsoft.com/internal/obd"/>
   </ds:schemaRefs>
 </ds:datastoreItem>
+</file>
+
+<file path=customXml/itemProps3.xml><?xml version="1.0" encoding="utf-8"?>
+<ds:datastoreItem xmlns:ds="http://schemas.openxmlformats.org/officeDocument/2006/customXml" ds:itemID="{758FDAC0-319D-4A54-8D8E-1D42CB1F8004}">
+  <ds:schemaRefs>
+    <ds:schemaRef ds:uri="http://schemas.microsoft.com/sharepoint/v3/contenttype/forms"/>
+  </ds:schemaRefs>
+</ds:datastoreItem>
 </file>
</xml_diff>